<commit_message>
Update the presentations to current year (2023-2024)
</commit_message>
<xml_diff>
--- a/Presentations/2021/schoolspace-presentation-2021-7.pptx
+++ b/Presentations/2021/schoolspace-presentation-2021-7.pptx
@@ -127,7 +127,7 @@
 <file path=ppt/revisionInfo.xml><?xml version="1.0" encoding="utf-8"?>
 <p1510:revInfo xmlns:a="http://schemas.openxmlformats.org/drawingml/2006/main" xmlns:r="http://schemas.openxmlformats.org/officeDocument/2006/relationships" xmlns:p1510="http://schemas.microsoft.com/office/powerpoint/2015/10/main">
   <p1510:revLst>
-    <p1510:client id="{99FFF661-61AA-4608-8BB8-F2261FFF17B4}" v="29" dt="2021-12-03T21:08:33.897"/>
+    <p1510:client id="{E79973C0-329F-4584-886C-594D30504B63}" v="1" dt="2023-11-24T07:26:21.575"/>
   </p1510:revLst>
 </p1510:revInfo>
 </file>
@@ -816,6 +816,38 @@
       </pc:sldChg>
     </pc:docChg>
   </pc:docChgLst>
+  <pc:docChgLst>
+    <pc:chgData name="Manolis Kiagias" userId="c3565f1950a8e34f" providerId="LiveId" clId="{E79973C0-329F-4584-886C-594D30504B63}"/>
+    <pc:docChg chg="custSel modSld">
+      <pc:chgData name="Manolis Kiagias" userId="c3565f1950a8e34f" providerId="LiveId" clId="{E79973C0-329F-4584-886C-594D30504B63}" dt="2023-11-24T07:26:21.575" v="1"/>
+      <pc:docMkLst>
+        <pc:docMk/>
+      </pc:docMkLst>
+      <pc:sldChg chg="addSp delSp modSp mod">
+        <pc:chgData name="Manolis Kiagias" userId="c3565f1950a8e34f" providerId="LiveId" clId="{E79973C0-329F-4584-886C-594D30504B63}" dt="2023-11-24T07:26:21.575" v="1"/>
+        <pc:sldMkLst>
+          <pc:docMk/>
+          <pc:sldMk cId="0" sldId="256"/>
+        </pc:sldMkLst>
+        <pc:picChg chg="add mod">
+          <ac:chgData name="Manolis Kiagias" userId="c3565f1950a8e34f" providerId="LiveId" clId="{E79973C0-329F-4584-886C-594D30504B63}" dt="2023-11-24T07:26:21.575" v="1"/>
+          <ac:picMkLst>
+            <pc:docMk/>
+            <pc:sldMk cId="0" sldId="256"/>
+            <ac:picMk id="2" creationId="{7EEA4C05-7EF1-0601-6E41-4794DB6A9C56}"/>
+          </ac:picMkLst>
+        </pc:picChg>
+        <pc:picChg chg="del">
+          <ac:chgData name="Manolis Kiagias" userId="c3565f1950a8e34f" providerId="LiveId" clId="{E79973C0-329F-4584-886C-594D30504B63}" dt="2023-11-24T07:26:20.715" v="0" actId="478"/>
+          <ac:picMkLst>
+            <pc:docMk/>
+            <pc:sldMk cId="0" sldId="256"/>
+            <ac:picMk id="41" creationId="{00000000-0000-0000-0000-000000000000}"/>
+          </ac:picMkLst>
+        </pc:picChg>
+      </pc:sldChg>
+    </pc:docChg>
+  </pc:docChgLst>
 </pc:chgInfo>
 </file>
 
@@ -3036,29 +3068,6 @@
           <a:chExt cx="0" cy="0"/>
         </a:xfrm>
       </p:grpSpPr>
-      <p:pic>
-        <p:nvPicPr>
-          <p:cNvPr id="41" name="Picture 40"/>
-          <p:cNvPicPr/>
-          <p:nvPr/>
-        </p:nvPicPr>
-        <p:blipFill>
-          <a:blip r:embed="rId2"/>
-          <a:stretch/>
-        </p:blipFill>
-        <p:spPr>
-          <a:xfrm>
-            <a:off x="216000" y="504000"/>
-            <a:ext cx="8640000" cy="1706040"/>
-          </a:xfrm>
-          <a:prstGeom prst="rect">
-            <a:avLst/>
-          </a:prstGeom>
-          <a:ln>
-            <a:noFill/>
-          </a:ln>
-        </p:spPr>
-      </p:pic>
       <p:sp>
         <p:nvSpPr>
           <p:cNvPr id="42" name="TextShape 1"/>
@@ -3220,6 +3229,47 @@
           </a:p>
         </p:txBody>
       </p:sp>
+      <p:pic>
+        <p:nvPicPr>
+          <p:cNvPr id="2" name="Picture 1">
+            <a:extLst>
+              <a:ext uri="{FF2B5EF4-FFF2-40B4-BE49-F238E27FC236}">
+                <a16:creationId xmlns:a16="http://schemas.microsoft.com/office/drawing/2014/main" id="{7EEA4C05-7EF1-0601-6E41-4794DB6A9C56}"/>
+              </a:ext>
+            </a:extLst>
+          </p:cNvPr>
+          <p:cNvPicPr>
+            <a:picLocks noChangeAspect="1"/>
+          </p:cNvPicPr>
+          <p:nvPr/>
+        </p:nvPicPr>
+        <p:blipFill>
+          <a:blip r:embed="rId2">
+            <a:clrChange>
+              <a:clrFrom>
+                <a:srgbClr val="FFFFFF"/>
+              </a:clrFrom>
+              <a:clrTo>
+                <a:srgbClr val="FFFFFF">
+                  <a:alpha val="0"/>
+                </a:srgbClr>
+              </a:clrTo>
+            </a:clrChange>
+          </a:blip>
+          <a:stretch>
+            <a:fillRect/>
+          </a:stretch>
+        </p:blipFill>
+        <p:spPr>
+          <a:xfrm>
+            <a:off x="8878" y="77821"/>
+            <a:ext cx="9135122" cy="2700502"/>
+          </a:xfrm>
+          <a:prstGeom prst="rect">
+            <a:avLst/>
+          </a:prstGeom>
+        </p:spPr>
+      </p:pic>
     </p:spTree>
   </p:cSld>
   <p:clrMapOvr>
@@ -3512,6 +3562,13 @@
             </a:effectRef>
             <a:fontRef idx="minor"/>
           </p:style>
+          <p:txBody>
+            <a:bodyPr/>
+            <a:lstStyle/>
+            <a:p>
+              <a:endParaRPr lang="el-GR"/>
+            </a:p>
+          </p:txBody>
         </p:sp>
         <p:sp>
           <p:nvSpPr>
@@ -3633,6 +3690,13 @@
           </a:effectRef>
           <a:fontRef idx="minor"/>
         </p:style>
+        <p:txBody>
+          <a:bodyPr/>
+          <a:lstStyle/>
+          <a:p>
+            <a:endParaRPr lang="el-GR"/>
+          </a:p>
+        </p:txBody>
       </p:sp>
       <p:sp>
         <p:nvSpPr>
@@ -3667,6 +3731,13 @@
           </a:effectRef>
           <a:fontRef idx="minor"/>
         </p:style>
+        <p:txBody>
+          <a:bodyPr/>
+          <a:lstStyle/>
+          <a:p>
+            <a:endParaRPr lang="el-GR"/>
+          </a:p>
+        </p:txBody>
       </p:sp>
       <p:sp>
         <p:nvSpPr>
@@ -3701,6 +3772,13 @@
           </a:effectRef>
           <a:fontRef idx="minor"/>
         </p:style>
+        <p:txBody>
+          <a:bodyPr/>
+          <a:lstStyle/>
+          <a:p>
+            <a:endParaRPr lang="el-GR"/>
+          </a:p>
+        </p:txBody>
       </p:sp>
       <p:grpSp>
         <p:nvGrpSpPr>
@@ -3755,6 +3833,13 @@
             </a:effectRef>
             <a:fontRef idx="minor"/>
           </p:style>
+          <p:txBody>
+            <a:bodyPr/>
+            <a:lstStyle/>
+            <a:p>
+              <a:endParaRPr lang="el-GR"/>
+            </a:p>
+          </p:txBody>
         </p:sp>
         <p:sp>
           <p:nvSpPr>
@@ -3789,6 +3874,13 @@
             </a:effectRef>
             <a:fontRef idx="minor"/>
           </p:style>
+          <p:txBody>
+            <a:bodyPr/>
+            <a:lstStyle/>
+            <a:p>
+              <a:endParaRPr lang="el-GR"/>
+            </a:p>
+          </p:txBody>
         </p:sp>
         <p:sp>
           <p:nvSpPr>
@@ -3825,6 +3917,13 @@
             </a:effectRef>
             <a:fontRef idx="minor"/>
           </p:style>
+          <p:txBody>
+            <a:bodyPr/>
+            <a:lstStyle/>
+            <a:p>
+              <a:endParaRPr lang="el-GR"/>
+            </a:p>
+          </p:txBody>
         </p:sp>
         <p:sp>
           <p:nvSpPr>
@@ -3861,6 +3960,13 @@
             </a:effectRef>
             <a:fontRef idx="minor"/>
           </p:style>
+          <p:txBody>
+            <a:bodyPr/>
+            <a:lstStyle/>
+            <a:p>
+              <a:endParaRPr lang="el-GR"/>
+            </a:p>
+          </p:txBody>
         </p:sp>
       </p:grpSp>
       <p:sp>
@@ -3970,6 +4076,13 @@
           </a:effectRef>
           <a:fontRef idx="minor"/>
         </p:style>
+        <p:txBody>
+          <a:bodyPr/>
+          <a:lstStyle/>
+          <a:p>
+            <a:endParaRPr lang="el-GR"/>
+          </a:p>
+        </p:txBody>
       </p:sp>
       <p:sp>
         <p:nvSpPr>
@@ -4004,6 +4117,13 @@
           </a:effectRef>
           <a:fontRef idx="minor"/>
         </p:style>
+        <p:txBody>
+          <a:bodyPr/>
+          <a:lstStyle/>
+          <a:p>
+            <a:endParaRPr lang="el-GR"/>
+          </a:p>
+        </p:txBody>
       </p:sp>
       <p:sp>
         <p:nvSpPr>
@@ -4038,6 +4158,13 @@
           </a:effectRef>
           <a:fontRef idx="minor"/>
         </p:style>
+        <p:txBody>
+          <a:bodyPr/>
+          <a:lstStyle/>
+          <a:p>
+            <a:endParaRPr lang="el-GR"/>
+          </a:p>
+        </p:txBody>
       </p:sp>
       <p:sp>
         <p:nvSpPr>
@@ -4072,6 +4199,13 @@
           </a:effectRef>
           <a:fontRef idx="minor"/>
         </p:style>
+        <p:txBody>
+          <a:bodyPr/>
+          <a:lstStyle/>
+          <a:p>
+            <a:endParaRPr lang="el-GR"/>
+          </a:p>
+        </p:txBody>
       </p:sp>
       <p:sp>
         <p:nvSpPr>
@@ -4106,6 +4240,13 @@
           </a:effectRef>
           <a:fontRef idx="minor"/>
         </p:style>
+        <p:txBody>
+          <a:bodyPr/>
+          <a:lstStyle/>
+          <a:p>
+            <a:endParaRPr lang="el-GR"/>
+          </a:p>
+        </p:txBody>
       </p:sp>
       <p:sp>
         <p:nvSpPr>
@@ -4140,6 +4281,13 @@
           </a:effectRef>
           <a:fontRef idx="minor"/>
         </p:style>
+        <p:txBody>
+          <a:bodyPr/>
+          <a:lstStyle/>
+          <a:p>
+            <a:endParaRPr lang="el-GR"/>
+          </a:p>
+        </p:txBody>
       </p:sp>
       <p:sp>
         <p:nvSpPr>
@@ -4174,6 +4322,13 @@
           </a:effectRef>
           <a:fontRef idx="minor"/>
         </p:style>
+        <p:txBody>
+          <a:bodyPr/>
+          <a:lstStyle/>
+          <a:p>
+            <a:endParaRPr lang="el-GR"/>
+          </a:p>
+        </p:txBody>
       </p:sp>
       <p:sp>
         <p:nvSpPr>
@@ -4208,6 +4363,13 @@
           </a:effectRef>
           <a:fontRef idx="minor"/>
         </p:style>
+        <p:txBody>
+          <a:bodyPr/>
+          <a:lstStyle/>
+          <a:p>
+            <a:endParaRPr lang="el-GR"/>
+          </a:p>
+        </p:txBody>
       </p:sp>
       <p:sp>
         <p:nvSpPr>
@@ -4242,6 +4404,13 @@
           </a:effectRef>
           <a:fontRef idx="minor"/>
         </p:style>
+        <p:txBody>
+          <a:bodyPr/>
+          <a:lstStyle/>
+          <a:p>
+            <a:endParaRPr lang="el-GR"/>
+          </a:p>
+        </p:txBody>
       </p:sp>
       <p:sp>
         <p:nvSpPr>
@@ -4276,6 +4445,13 @@
           </a:effectRef>
           <a:fontRef idx="minor"/>
         </p:style>
+        <p:txBody>
+          <a:bodyPr/>
+          <a:lstStyle/>
+          <a:p>
+            <a:endParaRPr lang="el-GR"/>
+          </a:p>
+        </p:txBody>
       </p:sp>
       <p:sp>
         <p:nvSpPr>
@@ -4310,6 +4486,13 @@
           </a:effectRef>
           <a:fontRef idx="minor"/>
         </p:style>
+        <p:txBody>
+          <a:bodyPr/>
+          <a:lstStyle/>
+          <a:p>
+            <a:endParaRPr lang="el-GR"/>
+          </a:p>
+        </p:txBody>
       </p:sp>
       <p:sp>
         <p:nvSpPr>
@@ -4344,6 +4527,13 @@
           </a:effectRef>
           <a:fontRef idx="minor"/>
         </p:style>
+        <p:txBody>
+          <a:bodyPr/>
+          <a:lstStyle/>
+          <a:p>
+            <a:endParaRPr lang="el-GR"/>
+          </a:p>
+        </p:txBody>
       </p:sp>
       <p:sp>
         <p:nvSpPr>
@@ -4384,6 +4574,13 @@
           </a:effectRef>
           <a:fontRef idx="minor"/>
         </p:style>
+        <p:txBody>
+          <a:bodyPr/>
+          <a:lstStyle/>
+          <a:p>
+            <a:endParaRPr lang="el-GR"/>
+          </a:p>
+        </p:txBody>
       </p:sp>
       <p:sp>
         <p:nvSpPr>
@@ -6438,6 +6635,13 @@
             </a:effectRef>
             <a:fontRef idx="minor"/>
           </p:style>
+          <p:txBody>
+            <a:bodyPr/>
+            <a:lstStyle/>
+            <a:p>
+              <a:endParaRPr lang="el-GR"/>
+            </a:p>
+          </p:txBody>
         </p:sp>
         <p:sp>
           <p:nvSpPr>
@@ -6472,6 +6676,13 @@
             </a:effectRef>
             <a:fontRef idx="minor"/>
           </p:style>
+          <p:txBody>
+            <a:bodyPr/>
+            <a:lstStyle/>
+            <a:p>
+              <a:endParaRPr lang="el-GR"/>
+            </a:p>
+          </p:txBody>
         </p:sp>
         <p:sp>
           <p:nvSpPr>
@@ -6506,6 +6717,13 @@
             </a:effectRef>
             <a:fontRef idx="minor"/>
           </p:style>
+          <p:txBody>
+            <a:bodyPr/>
+            <a:lstStyle/>
+            <a:p>
+              <a:endParaRPr lang="el-GR"/>
+            </a:p>
+          </p:txBody>
         </p:sp>
         <p:sp>
           <p:nvSpPr>
@@ -6540,6 +6758,13 @@
             </a:effectRef>
             <a:fontRef idx="minor"/>
           </p:style>
+          <p:txBody>
+            <a:bodyPr/>
+            <a:lstStyle/>
+            <a:p>
+              <a:endParaRPr lang="el-GR"/>
+            </a:p>
+          </p:txBody>
         </p:sp>
         <p:sp>
           <p:nvSpPr>
@@ -6574,6 +6799,13 @@
             </a:effectRef>
             <a:fontRef idx="minor"/>
           </p:style>
+          <p:txBody>
+            <a:bodyPr/>
+            <a:lstStyle/>
+            <a:p>
+              <a:endParaRPr lang="el-GR"/>
+            </a:p>
+          </p:txBody>
         </p:sp>
         <p:sp>
           <p:nvSpPr>
@@ -6608,6 +6840,13 @@
             </a:effectRef>
             <a:fontRef idx="minor"/>
           </p:style>
+          <p:txBody>
+            <a:bodyPr/>
+            <a:lstStyle/>
+            <a:p>
+              <a:endParaRPr lang="el-GR"/>
+            </a:p>
+          </p:txBody>
         </p:sp>
         <p:sp>
           <p:nvSpPr>
@@ -6642,6 +6881,13 @@
             </a:effectRef>
             <a:fontRef idx="minor"/>
           </p:style>
+          <p:txBody>
+            <a:bodyPr/>
+            <a:lstStyle/>
+            <a:p>
+              <a:endParaRPr lang="el-GR"/>
+            </a:p>
+          </p:txBody>
         </p:sp>
         <p:sp>
           <p:nvSpPr>
@@ -6676,6 +6922,13 @@
             </a:effectRef>
             <a:fontRef idx="minor"/>
           </p:style>
+          <p:txBody>
+            <a:bodyPr/>
+            <a:lstStyle/>
+            <a:p>
+              <a:endParaRPr lang="el-GR"/>
+            </a:p>
+          </p:txBody>
         </p:sp>
         <p:sp>
           <p:nvSpPr>
@@ -6710,6 +6963,13 @@
             </a:effectRef>
             <a:fontRef idx="minor"/>
           </p:style>
+          <p:txBody>
+            <a:bodyPr/>
+            <a:lstStyle/>
+            <a:p>
+              <a:endParaRPr lang="el-GR"/>
+            </a:p>
+          </p:txBody>
         </p:sp>
         <p:sp>
           <p:nvSpPr>
@@ -6744,6 +7004,13 @@
             </a:effectRef>
             <a:fontRef idx="minor"/>
           </p:style>
+          <p:txBody>
+            <a:bodyPr/>
+            <a:lstStyle/>
+            <a:p>
+              <a:endParaRPr lang="el-GR"/>
+            </a:p>
+          </p:txBody>
         </p:sp>
         <p:sp>
           <p:nvSpPr>
@@ -6778,6 +7045,13 @@
             </a:effectRef>
             <a:fontRef idx="minor"/>
           </p:style>
+          <p:txBody>
+            <a:bodyPr/>
+            <a:lstStyle/>
+            <a:p>
+              <a:endParaRPr lang="el-GR"/>
+            </a:p>
+          </p:txBody>
         </p:sp>
         <p:sp>
           <p:nvSpPr>
@@ -6812,6 +7086,13 @@
             </a:effectRef>
             <a:fontRef idx="minor"/>
           </p:style>
+          <p:txBody>
+            <a:bodyPr/>
+            <a:lstStyle/>
+            <a:p>
+              <a:endParaRPr lang="el-GR"/>
+            </a:p>
+          </p:txBody>
         </p:sp>
       </p:grpSp>
       <p:sp>
@@ -6847,6 +7128,13 @@
           </a:effectRef>
           <a:fontRef idx="minor"/>
         </p:style>
+        <p:txBody>
+          <a:bodyPr/>
+          <a:lstStyle/>
+          <a:p>
+            <a:endParaRPr lang="el-GR"/>
+          </a:p>
+        </p:txBody>
       </p:sp>
       <p:sp>
         <p:nvSpPr>
@@ -6881,6 +7169,13 @@
           </a:effectRef>
           <a:fontRef idx="minor"/>
         </p:style>
+        <p:txBody>
+          <a:bodyPr/>
+          <a:lstStyle/>
+          <a:p>
+            <a:endParaRPr lang="el-GR"/>
+          </a:p>
+        </p:txBody>
       </p:sp>
       <p:sp>
         <p:nvSpPr>
@@ -7001,6 +7296,13 @@
           </a:effectRef>
           <a:fontRef idx="minor"/>
         </p:style>
+        <p:txBody>
+          <a:bodyPr/>
+          <a:lstStyle/>
+          <a:p>
+            <a:endParaRPr lang="el-GR"/>
+          </a:p>
+        </p:txBody>
       </p:sp>
       <p:sp>
         <p:nvSpPr>
@@ -7035,6 +7337,13 @@
           </a:effectRef>
           <a:fontRef idx="minor"/>
         </p:style>
+        <p:txBody>
+          <a:bodyPr/>
+          <a:lstStyle/>
+          <a:p>
+            <a:endParaRPr lang="el-GR"/>
+          </a:p>
+        </p:txBody>
       </p:sp>
       <p:sp>
         <p:nvSpPr>
@@ -7069,6 +7378,13 @@
           </a:effectRef>
           <a:fontRef idx="minor"/>
         </p:style>
+        <p:txBody>
+          <a:bodyPr/>
+          <a:lstStyle/>
+          <a:p>
+            <a:endParaRPr lang="el-GR"/>
+          </a:p>
+        </p:txBody>
       </p:sp>
       <p:sp>
         <p:nvSpPr>
@@ -7103,6 +7419,13 @@
           </a:effectRef>
           <a:fontRef idx="minor"/>
         </p:style>
+        <p:txBody>
+          <a:bodyPr/>
+          <a:lstStyle/>
+          <a:p>
+            <a:endParaRPr lang="el-GR"/>
+          </a:p>
+        </p:txBody>
       </p:sp>
       <p:sp>
         <p:nvSpPr>
@@ -7189,6 +7512,13 @@
           </a:effectRef>
           <a:fontRef idx="minor"/>
         </p:style>
+        <p:txBody>
+          <a:bodyPr/>
+          <a:lstStyle/>
+          <a:p>
+            <a:endParaRPr lang="el-GR"/>
+          </a:p>
+        </p:txBody>
       </p:sp>
       <p:sp>
         <p:nvSpPr>
@@ -7257,6 +7587,13 @@
           </a:effectRef>
           <a:fontRef idx="minor"/>
         </p:style>
+        <p:txBody>
+          <a:bodyPr/>
+          <a:lstStyle/>
+          <a:p>
+            <a:endParaRPr lang="el-GR"/>
+          </a:p>
+        </p:txBody>
       </p:sp>
       <p:sp>
         <p:nvSpPr>
@@ -7639,6 +7976,13 @@
             </a:effectRef>
             <a:fontRef idx="minor"/>
           </p:style>
+          <p:txBody>
+            <a:bodyPr/>
+            <a:lstStyle/>
+            <a:p>
+              <a:endParaRPr lang="el-GR"/>
+            </a:p>
+          </p:txBody>
         </p:sp>
         <p:sp>
           <p:nvSpPr>
@@ -7673,6 +8017,13 @@
             </a:effectRef>
             <a:fontRef idx="minor"/>
           </p:style>
+          <p:txBody>
+            <a:bodyPr/>
+            <a:lstStyle/>
+            <a:p>
+              <a:endParaRPr lang="el-GR"/>
+            </a:p>
+          </p:txBody>
         </p:sp>
         <p:sp>
           <p:nvSpPr>
@@ -7707,6 +8058,13 @@
             </a:effectRef>
             <a:fontRef idx="minor"/>
           </p:style>
+          <p:txBody>
+            <a:bodyPr/>
+            <a:lstStyle/>
+            <a:p>
+              <a:endParaRPr lang="el-GR"/>
+            </a:p>
+          </p:txBody>
         </p:sp>
         <p:sp>
           <p:nvSpPr>
@@ -7741,6 +8099,13 @@
             </a:effectRef>
             <a:fontRef idx="minor"/>
           </p:style>
+          <p:txBody>
+            <a:bodyPr/>
+            <a:lstStyle/>
+            <a:p>
+              <a:endParaRPr lang="el-GR"/>
+            </a:p>
+          </p:txBody>
         </p:sp>
         <p:sp>
           <p:nvSpPr>
@@ -7775,6 +8140,13 @@
             </a:effectRef>
             <a:fontRef idx="minor"/>
           </p:style>
+          <p:txBody>
+            <a:bodyPr/>
+            <a:lstStyle/>
+            <a:p>
+              <a:endParaRPr lang="el-GR"/>
+            </a:p>
+          </p:txBody>
         </p:sp>
         <p:sp>
           <p:nvSpPr>
@@ -7809,6 +8181,13 @@
             </a:effectRef>
             <a:fontRef idx="minor"/>
           </p:style>
+          <p:txBody>
+            <a:bodyPr/>
+            <a:lstStyle/>
+            <a:p>
+              <a:endParaRPr lang="el-GR"/>
+            </a:p>
+          </p:txBody>
         </p:sp>
         <p:sp>
           <p:nvSpPr>
@@ -7843,6 +8222,13 @@
             </a:effectRef>
             <a:fontRef idx="minor"/>
           </p:style>
+          <p:txBody>
+            <a:bodyPr/>
+            <a:lstStyle/>
+            <a:p>
+              <a:endParaRPr lang="el-GR"/>
+            </a:p>
+          </p:txBody>
         </p:sp>
         <p:sp>
           <p:nvSpPr>
@@ -7877,6 +8263,13 @@
             </a:effectRef>
             <a:fontRef idx="minor"/>
           </p:style>
+          <p:txBody>
+            <a:bodyPr/>
+            <a:lstStyle/>
+            <a:p>
+              <a:endParaRPr lang="el-GR"/>
+            </a:p>
+          </p:txBody>
         </p:sp>
         <p:sp>
           <p:nvSpPr>
@@ -7911,6 +8304,13 @@
             </a:effectRef>
             <a:fontRef idx="minor"/>
           </p:style>
+          <p:txBody>
+            <a:bodyPr/>
+            <a:lstStyle/>
+            <a:p>
+              <a:endParaRPr lang="el-GR"/>
+            </a:p>
+          </p:txBody>
         </p:sp>
         <p:sp>
           <p:nvSpPr>
@@ -7945,6 +8345,13 @@
             </a:effectRef>
             <a:fontRef idx="minor"/>
           </p:style>
+          <p:txBody>
+            <a:bodyPr/>
+            <a:lstStyle/>
+            <a:p>
+              <a:endParaRPr lang="el-GR"/>
+            </a:p>
+          </p:txBody>
         </p:sp>
         <p:sp>
           <p:nvSpPr>
@@ -7979,6 +8386,13 @@
             </a:effectRef>
             <a:fontRef idx="minor"/>
           </p:style>
+          <p:txBody>
+            <a:bodyPr/>
+            <a:lstStyle/>
+            <a:p>
+              <a:endParaRPr lang="el-GR"/>
+            </a:p>
+          </p:txBody>
         </p:sp>
         <p:sp>
           <p:nvSpPr>
@@ -8013,6 +8427,13 @@
             </a:effectRef>
             <a:fontRef idx="minor"/>
           </p:style>
+          <p:txBody>
+            <a:bodyPr/>
+            <a:lstStyle/>
+            <a:p>
+              <a:endParaRPr lang="el-GR"/>
+            </a:p>
+          </p:txBody>
         </p:sp>
       </p:grpSp>
       <p:sp>
@@ -8048,6 +8469,13 @@
           </a:effectRef>
           <a:fontRef idx="minor"/>
         </p:style>
+        <p:txBody>
+          <a:bodyPr/>
+          <a:lstStyle/>
+          <a:p>
+            <a:endParaRPr lang="el-GR"/>
+          </a:p>
+        </p:txBody>
       </p:sp>
       <p:sp>
         <p:nvSpPr>
@@ -8082,6 +8510,13 @@
           </a:effectRef>
           <a:fontRef idx="minor"/>
         </p:style>
+        <p:txBody>
+          <a:bodyPr/>
+          <a:lstStyle/>
+          <a:p>
+            <a:endParaRPr lang="el-GR"/>
+          </a:p>
+        </p:txBody>
       </p:sp>
       <p:sp>
         <p:nvSpPr>
@@ -8202,6 +8637,13 @@
           </a:effectRef>
           <a:fontRef idx="minor"/>
         </p:style>
+        <p:txBody>
+          <a:bodyPr/>
+          <a:lstStyle/>
+          <a:p>
+            <a:endParaRPr lang="el-GR"/>
+          </a:p>
+        </p:txBody>
       </p:sp>
       <p:sp>
         <p:nvSpPr>
@@ -8236,6 +8678,13 @@
           </a:effectRef>
           <a:fontRef idx="minor"/>
         </p:style>
+        <p:txBody>
+          <a:bodyPr/>
+          <a:lstStyle/>
+          <a:p>
+            <a:endParaRPr lang="el-GR"/>
+          </a:p>
+        </p:txBody>
       </p:sp>
       <p:sp>
         <p:nvSpPr>
@@ -8270,6 +8719,13 @@
           </a:effectRef>
           <a:fontRef idx="minor"/>
         </p:style>
+        <p:txBody>
+          <a:bodyPr/>
+          <a:lstStyle/>
+          <a:p>
+            <a:endParaRPr lang="el-GR"/>
+          </a:p>
+        </p:txBody>
       </p:sp>
       <p:sp>
         <p:nvSpPr>
@@ -8304,6 +8760,13 @@
           </a:effectRef>
           <a:fontRef idx="minor"/>
         </p:style>
+        <p:txBody>
+          <a:bodyPr/>
+          <a:lstStyle/>
+          <a:p>
+            <a:endParaRPr lang="el-GR"/>
+          </a:p>
+        </p:txBody>
       </p:sp>
       <p:sp>
         <p:nvSpPr>
@@ -8381,6 +8844,13 @@
           </a:effectRef>
           <a:fontRef idx="minor"/>
         </p:style>
+        <p:txBody>
+          <a:bodyPr/>
+          <a:lstStyle/>
+          <a:p>
+            <a:endParaRPr lang="el-GR"/>
+          </a:p>
+        </p:txBody>
       </p:sp>
       <p:sp>
         <p:nvSpPr>
@@ -8449,6 +8919,13 @@
           </a:effectRef>
           <a:fontRef idx="minor"/>
         </p:style>
+        <p:txBody>
+          <a:bodyPr/>
+          <a:lstStyle/>
+          <a:p>
+            <a:endParaRPr lang="el-GR"/>
+          </a:p>
+        </p:txBody>
       </p:sp>
       <p:sp>
         <p:nvSpPr>
@@ -8831,6 +9308,13 @@
             </a:effectRef>
             <a:fontRef idx="minor"/>
           </p:style>
+          <p:txBody>
+            <a:bodyPr/>
+            <a:lstStyle/>
+            <a:p>
+              <a:endParaRPr lang="el-GR"/>
+            </a:p>
+          </p:txBody>
         </p:sp>
         <p:sp>
           <p:nvSpPr>
@@ -8865,6 +9349,13 @@
             </a:effectRef>
             <a:fontRef idx="minor"/>
           </p:style>
+          <p:txBody>
+            <a:bodyPr/>
+            <a:lstStyle/>
+            <a:p>
+              <a:endParaRPr lang="el-GR"/>
+            </a:p>
+          </p:txBody>
         </p:sp>
         <p:sp>
           <p:nvSpPr>
@@ -8899,6 +9390,13 @@
             </a:effectRef>
             <a:fontRef idx="minor"/>
           </p:style>
+          <p:txBody>
+            <a:bodyPr/>
+            <a:lstStyle/>
+            <a:p>
+              <a:endParaRPr lang="el-GR"/>
+            </a:p>
+          </p:txBody>
         </p:sp>
         <p:sp>
           <p:nvSpPr>
@@ -8933,6 +9431,13 @@
             </a:effectRef>
             <a:fontRef idx="minor"/>
           </p:style>
+          <p:txBody>
+            <a:bodyPr/>
+            <a:lstStyle/>
+            <a:p>
+              <a:endParaRPr lang="el-GR"/>
+            </a:p>
+          </p:txBody>
         </p:sp>
         <p:sp>
           <p:nvSpPr>
@@ -8967,6 +9472,13 @@
             </a:effectRef>
             <a:fontRef idx="minor"/>
           </p:style>
+          <p:txBody>
+            <a:bodyPr/>
+            <a:lstStyle/>
+            <a:p>
+              <a:endParaRPr lang="el-GR"/>
+            </a:p>
+          </p:txBody>
         </p:sp>
         <p:sp>
           <p:nvSpPr>
@@ -9001,6 +9513,13 @@
             </a:effectRef>
             <a:fontRef idx="minor"/>
           </p:style>
+          <p:txBody>
+            <a:bodyPr/>
+            <a:lstStyle/>
+            <a:p>
+              <a:endParaRPr lang="el-GR"/>
+            </a:p>
+          </p:txBody>
         </p:sp>
         <p:sp>
           <p:nvSpPr>
@@ -9035,6 +9554,13 @@
             </a:effectRef>
             <a:fontRef idx="minor"/>
           </p:style>
+          <p:txBody>
+            <a:bodyPr/>
+            <a:lstStyle/>
+            <a:p>
+              <a:endParaRPr lang="el-GR"/>
+            </a:p>
+          </p:txBody>
         </p:sp>
         <p:sp>
           <p:nvSpPr>
@@ -9069,6 +9595,13 @@
             </a:effectRef>
             <a:fontRef idx="minor"/>
           </p:style>
+          <p:txBody>
+            <a:bodyPr/>
+            <a:lstStyle/>
+            <a:p>
+              <a:endParaRPr lang="el-GR"/>
+            </a:p>
+          </p:txBody>
         </p:sp>
         <p:sp>
           <p:nvSpPr>
@@ -9103,6 +9636,13 @@
             </a:effectRef>
             <a:fontRef idx="minor"/>
           </p:style>
+          <p:txBody>
+            <a:bodyPr/>
+            <a:lstStyle/>
+            <a:p>
+              <a:endParaRPr lang="el-GR"/>
+            </a:p>
+          </p:txBody>
         </p:sp>
         <p:sp>
           <p:nvSpPr>
@@ -9137,6 +9677,13 @@
             </a:effectRef>
             <a:fontRef idx="minor"/>
           </p:style>
+          <p:txBody>
+            <a:bodyPr/>
+            <a:lstStyle/>
+            <a:p>
+              <a:endParaRPr lang="el-GR"/>
+            </a:p>
+          </p:txBody>
         </p:sp>
         <p:sp>
           <p:nvSpPr>
@@ -9171,6 +9718,13 @@
             </a:effectRef>
             <a:fontRef idx="minor"/>
           </p:style>
+          <p:txBody>
+            <a:bodyPr/>
+            <a:lstStyle/>
+            <a:p>
+              <a:endParaRPr lang="el-GR"/>
+            </a:p>
+          </p:txBody>
         </p:sp>
         <p:sp>
           <p:nvSpPr>
@@ -9205,6 +9759,13 @@
             </a:effectRef>
             <a:fontRef idx="minor"/>
           </p:style>
+          <p:txBody>
+            <a:bodyPr/>
+            <a:lstStyle/>
+            <a:p>
+              <a:endParaRPr lang="el-GR"/>
+            </a:p>
+          </p:txBody>
         </p:sp>
       </p:grpSp>
       <p:sp>
@@ -9240,6 +9801,13 @@
           </a:effectRef>
           <a:fontRef idx="minor"/>
         </p:style>
+        <p:txBody>
+          <a:bodyPr/>
+          <a:lstStyle/>
+          <a:p>
+            <a:endParaRPr lang="el-GR"/>
+          </a:p>
+        </p:txBody>
       </p:sp>
       <p:sp>
         <p:nvSpPr>
@@ -9274,6 +9842,13 @@
           </a:effectRef>
           <a:fontRef idx="minor"/>
         </p:style>
+        <p:txBody>
+          <a:bodyPr/>
+          <a:lstStyle/>
+          <a:p>
+            <a:endParaRPr lang="el-GR"/>
+          </a:p>
+        </p:txBody>
       </p:sp>
       <p:sp>
         <p:nvSpPr>
@@ -9394,6 +9969,13 @@
           </a:effectRef>
           <a:fontRef idx="minor"/>
         </p:style>
+        <p:txBody>
+          <a:bodyPr/>
+          <a:lstStyle/>
+          <a:p>
+            <a:endParaRPr lang="el-GR"/>
+          </a:p>
+        </p:txBody>
       </p:sp>
       <p:sp>
         <p:nvSpPr>
@@ -9428,6 +10010,13 @@
           </a:effectRef>
           <a:fontRef idx="minor"/>
         </p:style>
+        <p:txBody>
+          <a:bodyPr/>
+          <a:lstStyle/>
+          <a:p>
+            <a:endParaRPr lang="el-GR"/>
+          </a:p>
+        </p:txBody>
       </p:sp>
       <p:sp>
         <p:nvSpPr>
@@ -9462,6 +10051,13 @@
           </a:effectRef>
           <a:fontRef idx="minor"/>
         </p:style>
+        <p:txBody>
+          <a:bodyPr/>
+          <a:lstStyle/>
+          <a:p>
+            <a:endParaRPr lang="el-GR"/>
+          </a:p>
+        </p:txBody>
       </p:sp>
       <p:sp>
         <p:nvSpPr>
@@ -9496,6 +10092,13 @@
           </a:effectRef>
           <a:fontRef idx="minor"/>
         </p:style>
+        <p:txBody>
+          <a:bodyPr/>
+          <a:lstStyle/>
+          <a:p>
+            <a:endParaRPr lang="el-GR"/>
+          </a:p>
+        </p:txBody>
       </p:sp>
       <p:sp>
         <p:nvSpPr>
@@ -9573,6 +10176,13 @@
           </a:effectRef>
           <a:fontRef idx="minor"/>
         </p:style>
+        <p:txBody>
+          <a:bodyPr/>
+          <a:lstStyle/>
+          <a:p>
+            <a:endParaRPr lang="el-GR"/>
+          </a:p>
+        </p:txBody>
       </p:sp>
       <p:sp>
         <p:nvSpPr>
@@ -9641,6 +10251,13 @@
           </a:effectRef>
           <a:fontRef idx="minor"/>
         </p:style>
+        <p:txBody>
+          <a:bodyPr/>
+          <a:lstStyle/>
+          <a:p>
+            <a:endParaRPr lang="el-GR"/>
+          </a:p>
+        </p:txBody>
       </p:sp>
       <p:sp>
         <p:nvSpPr>
@@ -10023,6 +10640,13 @@
             </a:effectRef>
             <a:fontRef idx="minor"/>
           </p:style>
+          <p:txBody>
+            <a:bodyPr/>
+            <a:lstStyle/>
+            <a:p>
+              <a:endParaRPr lang="el-GR"/>
+            </a:p>
+          </p:txBody>
         </p:sp>
         <p:sp>
           <p:nvSpPr>
@@ -10057,6 +10681,13 @@
             </a:effectRef>
             <a:fontRef idx="minor"/>
           </p:style>
+          <p:txBody>
+            <a:bodyPr/>
+            <a:lstStyle/>
+            <a:p>
+              <a:endParaRPr lang="el-GR"/>
+            </a:p>
+          </p:txBody>
         </p:sp>
         <p:sp>
           <p:nvSpPr>
@@ -10091,6 +10722,13 @@
             </a:effectRef>
             <a:fontRef idx="minor"/>
           </p:style>
+          <p:txBody>
+            <a:bodyPr/>
+            <a:lstStyle/>
+            <a:p>
+              <a:endParaRPr lang="el-GR"/>
+            </a:p>
+          </p:txBody>
         </p:sp>
         <p:sp>
           <p:nvSpPr>
@@ -10125,6 +10763,13 @@
             </a:effectRef>
             <a:fontRef idx="minor"/>
           </p:style>
+          <p:txBody>
+            <a:bodyPr/>
+            <a:lstStyle/>
+            <a:p>
+              <a:endParaRPr lang="el-GR"/>
+            </a:p>
+          </p:txBody>
         </p:sp>
         <p:sp>
           <p:nvSpPr>
@@ -10159,6 +10804,13 @@
             </a:effectRef>
             <a:fontRef idx="minor"/>
           </p:style>
+          <p:txBody>
+            <a:bodyPr/>
+            <a:lstStyle/>
+            <a:p>
+              <a:endParaRPr lang="el-GR"/>
+            </a:p>
+          </p:txBody>
         </p:sp>
         <p:sp>
           <p:nvSpPr>
@@ -10193,6 +10845,13 @@
             </a:effectRef>
             <a:fontRef idx="minor"/>
           </p:style>
+          <p:txBody>
+            <a:bodyPr/>
+            <a:lstStyle/>
+            <a:p>
+              <a:endParaRPr lang="el-GR"/>
+            </a:p>
+          </p:txBody>
         </p:sp>
         <p:sp>
           <p:nvSpPr>
@@ -10227,6 +10886,13 @@
             </a:effectRef>
             <a:fontRef idx="minor"/>
           </p:style>
+          <p:txBody>
+            <a:bodyPr/>
+            <a:lstStyle/>
+            <a:p>
+              <a:endParaRPr lang="el-GR"/>
+            </a:p>
+          </p:txBody>
         </p:sp>
         <p:sp>
           <p:nvSpPr>
@@ -10261,6 +10927,13 @@
             </a:effectRef>
             <a:fontRef idx="minor"/>
           </p:style>
+          <p:txBody>
+            <a:bodyPr/>
+            <a:lstStyle/>
+            <a:p>
+              <a:endParaRPr lang="el-GR"/>
+            </a:p>
+          </p:txBody>
         </p:sp>
         <p:sp>
           <p:nvSpPr>
@@ -10295,6 +10968,13 @@
             </a:effectRef>
             <a:fontRef idx="minor"/>
           </p:style>
+          <p:txBody>
+            <a:bodyPr/>
+            <a:lstStyle/>
+            <a:p>
+              <a:endParaRPr lang="el-GR"/>
+            </a:p>
+          </p:txBody>
         </p:sp>
         <p:sp>
           <p:nvSpPr>
@@ -10329,6 +11009,13 @@
             </a:effectRef>
             <a:fontRef idx="minor"/>
           </p:style>
+          <p:txBody>
+            <a:bodyPr/>
+            <a:lstStyle/>
+            <a:p>
+              <a:endParaRPr lang="el-GR"/>
+            </a:p>
+          </p:txBody>
         </p:sp>
         <p:sp>
           <p:nvSpPr>
@@ -10363,6 +11050,13 @@
             </a:effectRef>
             <a:fontRef idx="minor"/>
           </p:style>
+          <p:txBody>
+            <a:bodyPr/>
+            <a:lstStyle/>
+            <a:p>
+              <a:endParaRPr lang="el-GR"/>
+            </a:p>
+          </p:txBody>
         </p:sp>
         <p:sp>
           <p:nvSpPr>
@@ -10397,6 +11091,13 @@
             </a:effectRef>
             <a:fontRef idx="minor"/>
           </p:style>
+          <p:txBody>
+            <a:bodyPr/>
+            <a:lstStyle/>
+            <a:p>
+              <a:endParaRPr lang="el-GR"/>
+            </a:p>
+          </p:txBody>
         </p:sp>
       </p:grpSp>
       <p:sp>
@@ -10432,6 +11133,13 @@
           </a:effectRef>
           <a:fontRef idx="minor"/>
         </p:style>
+        <p:txBody>
+          <a:bodyPr/>
+          <a:lstStyle/>
+          <a:p>
+            <a:endParaRPr lang="el-GR"/>
+          </a:p>
+        </p:txBody>
       </p:sp>
       <p:sp>
         <p:nvSpPr>
@@ -10466,6 +11174,13 @@
           </a:effectRef>
           <a:fontRef idx="minor"/>
         </p:style>
+        <p:txBody>
+          <a:bodyPr/>
+          <a:lstStyle/>
+          <a:p>
+            <a:endParaRPr lang="el-GR"/>
+          </a:p>
+        </p:txBody>
       </p:sp>
       <p:grpSp>
         <p:nvGrpSpPr>
@@ -10520,6 +11235,13 @@
             </a:effectRef>
             <a:fontRef idx="minor"/>
           </p:style>
+          <p:txBody>
+            <a:bodyPr/>
+            <a:lstStyle/>
+            <a:p>
+              <a:endParaRPr lang="el-GR"/>
+            </a:p>
+          </p:txBody>
         </p:sp>
         <p:sp>
           <p:nvSpPr>
@@ -10554,6 +11276,13 @@
             </a:effectRef>
             <a:fontRef idx="minor"/>
           </p:style>
+          <p:txBody>
+            <a:bodyPr/>
+            <a:lstStyle/>
+            <a:p>
+              <a:endParaRPr lang="el-GR"/>
+            </a:p>
+          </p:txBody>
         </p:sp>
         <p:sp>
           <p:nvSpPr>
@@ -10674,6 +11403,13 @@
             </a:effectRef>
             <a:fontRef idx="minor"/>
           </p:style>
+          <p:txBody>
+            <a:bodyPr/>
+            <a:lstStyle/>
+            <a:p>
+              <a:endParaRPr lang="el-GR"/>
+            </a:p>
+          </p:txBody>
         </p:sp>
         <p:sp>
           <p:nvSpPr>
@@ -10708,6 +11444,13 @@
             </a:effectRef>
             <a:fontRef idx="minor"/>
           </p:style>
+          <p:txBody>
+            <a:bodyPr/>
+            <a:lstStyle/>
+            <a:p>
+              <a:endParaRPr lang="el-GR"/>
+            </a:p>
+          </p:txBody>
         </p:sp>
         <p:sp>
           <p:nvSpPr>
@@ -10829,6 +11572,13 @@
           </a:effectRef>
           <a:fontRef idx="minor"/>
         </p:style>
+        <p:txBody>
+          <a:bodyPr/>
+          <a:lstStyle/>
+          <a:p>
+            <a:endParaRPr lang="el-GR"/>
+          </a:p>
+        </p:txBody>
       </p:sp>
       <p:sp>
         <p:nvSpPr>
@@ -11415,6 +12165,13 @@
           </a:effectRef>
           <a:fontRef idx="minor"/>
         </p:style>
+        <p:txBody>
+          <a:bodyPr/>
+          <a:lstStyle/>
+          <a:p>
+            <a:endParaRPr lang="el-GR"/>
+          </a:p>
+        </p:txBody>
       </p:sp>
       <p:sp>
         <p:nvSpPr>
@@ -11449,6 +12206,13 @@
           </a:effectRef>
           <a:fontRef idx="minor"/>
         </p:style>
+        <p:txBody>
+          <a:bodyPr/>
+          <a:lstStyle/>
+          <a:p>
+            <a:endParaRPr lang="el-GR"/>
+          </a:p>
+        </p:txBody>
       </p:sp>
       <p:sp>
         <p:nvSpPr>
@@ -11483,6 +12247,13 @@
           </a:effectRef>
           <a:fontRef idx="minor"/>
         </p:style>
+        <p:txBody>
+          <a:bodyPr/>
+          <a:lstStyle/>
+          <a:p>
+            <a:endParaRPr lang="el-GR"/>
+          </a:p>
+        </p:txBody>
       </p:sp>
       <p:grpSp>
         <p:nvGrpSpPr>
@@ -11531,6 +12302,13 @@
             </a:effectRef>
             <a:fontRef idx="minor"/>
           </p:style>
+          <p:txBody>
+            <a:bodyPr/>
+            <a:lstStyle/>
+            <a:p>
+              <a:endParaRPr lang="el-GR"/>
+            </a:p>
+          </p:txBody>
         </p:sp>
         <p:sp>
           <p:nvSpPr>
@@ -11565,6 +12343,13 @@
             </a:effectRef>
             <a:fontRef idx="minor"/>
           </p:style>
+          <p:txBody>
+            <a:bodyPr/>
+            <a:lstStyle/>
+            <a:p>
+              <a:endParaRPr lang="el-GR"/>
+            </a:p>
+          </p:txBody>
         </p:sp>
         <p:sp>
           <p:nvSpPr>
@@ -11686,6 +12471,13 @@
           </a:effectRef>
           <a:fontRef idx="minor"/>
         </p:style>
+        <p:txBody>
+          <a:bodyPr/>
+          <a:lstStyle/>
+          <a:p>
+            <a:endParaRPr lang="el-GR"/>
+          </a:p>
+        </p:txBody>
       </p:sp>
       <p:sp>
         <p:nvSpPr>
@@ -11720,6 +12512,13 @@
           </a:effectRef>
           <a:fontRef idx="minor"/>
         </p:style>
+        <p:txBody>
+          <a:bodyPr/>
+          <a:lstStyle/>
+          <a:p>
+            <a:endParaRPr lang="el-GR"/>
+          </a:p>
+        </p:txBody>
       </p:sp>
       <p:sp>
         <p:nvSpPr>
@@ -11754,6 +12553,13 @@
           </a:effectRef>
           <a:fontRef idx="minor"/>
         </p:style>
+        <p:txBody>
+          <a:bodyPr/>
+          <a:lstStyle/>
+          <a:p>
+            <a:endParaRPr lang="el-GR"/>
+          </a:p>
+        </p:txBody>
       </p:sp>
       <p:sp>
         <p:nvSpPr>
@@ -11788,6 +12594,13 @@
           </a:effectRef>
           <a:fontRef idx="minor"/>
         </p:style>
+        <p:txBody>
+          <a:bodyPr/>
+          <a:lstStyle/>
+          <a:p>
+            <a:endParaRPr lang="el-GR"/>
+          </a:p>
+        </p:txBody>
       </p:sp>
       <p:sp>
         <p:nvSpPr>
@@ -11824,6 +12637,13 @@
           </a:effectRef>
           <a:fontRef idx="minor"/>
         </p:style>
+        <p:txBody>
+          <a:bodyPr/>
+          <a:lstStyle/>
+          <a:p>
+            <a:endParaRPr lang="el-GR"/>
+          </a:p>
+        </p:txBody>
       </p:sp>
       <p:sp>
         <p:nvSpPr>
@@ -11860,6 +12680,13 @@
           </a:effectRef>
           <a:fontRef idx="minor"/>
         </p:style>
+        <p:txBody>
+          <a:bodyPr/>
+          <a:lstStyle/>
+          <a:p>
+            <a:endParaRPr lang="el-GR"/>
+          </a:p>
+        </p:txBody>
       </p:sp>
       <p:sp>
         <p:nvSpPr>
@@ -12616,6 +13443,13 @@
           </a:effectRef>
           <a:fontRef idx="minor"/>
         </p:style>
+        <p:txBody>
+          <a:bodyPr/>
+          <a:lstStyle/>
+          <a:p>
+            <a:endParaRPr lang="el-GR"/>
+          </a:p>
+        </p:txBody>
       </p:sp>
       <p:sp>
         <p:nvSpPr>
@@ -12650,6 +13484,13 @@
           </a:effectRef>
           <a:fontRef idx="minor"/>
         </p:style>
+        <p:txBody>
+          <a:bodyPr/>
+          <a:lstStyle/>
+          <a:p>
+            <a:endParaRPr lang="el-GR"/>
+          </a:p>
+        </p:txBody>
       </p:sp>
       <p:sp>
         <p:nvSpPr>
@@ -12684,6 +13525,13 @@
           </a:effectRef>
           <a:fontRef idx="minor"/>
         </p:style>
+        <p:txBody>
+          <a:bodyPr/>
+          <a:lstStyle/>
+          <a:p>
+            <a:endParaRPr lang="el-GR"/>
+          </a:p>
+        </p:txBody>
       </p:sp>
       <p:grpSp>
         <p:nvGrpSpPr>
@@ -12732,6 +13580,13 @@
             </a:effectRef>
             <a:fontRef idx="minor"/>
           </p:style>
+          <p:txBody>
+            <a:bodyPr/>
+            <a:lstStyle/>
+            <a:p>
+              <a:endParaRPr lang="el-GR"/>
+            </a:p>
+          </p:txBody>
         </p:sp>
         <p:sp>
           <p:nvSpPr>
@@ -12766,6 +13621,13 @@
             </a:effectRef>
             <a:fontRef idx="minor"/>
           </p:style>
+          <p:txBody>
+            <a:bodyPr/>
+            <a:lstStyle/>
+            <a:p>
+              <a:endParaRPr lang="el-GR"/>
+            </a:p>
+          </p:txBody>
         </p:sp>
         <p:sp>
           <p:nvSpPr>
@@ -12930,6 +13792,13 @@
           </a:effectRef>
           <a:fontRef idx="minor"/>
         </p:style>
+        <p:txBody>
+          <a:bodyPr/>
+          <a:lstStyle/>
+          <a:p>
+            <a:endParaRPr lang="el-GR"/>
+          </a:p>
+        </p:txBody>
       </p:sp>
       <p:sp>
         <p:nvSpPr>
@@ -12964,6 +13833,13 @@
           </a:effectRef>
           <a:fontRef idx="minor"/>
         </p:style>
+        <p:txBody>
+          <a:bodyPr/>
+          <a:lstStyle/>
+          <a:p>
+            <a:endParaRPr lang="el-GR"/>
+          </a:p>
+        </p:txBody>
       </p:sp>
       <p:sp>
         <p:nvSpPr>
@@ -12998,6 +13874,13 @@
           </a:effectRef>
           <a:fontRef idx="minor"/>
         </p:style>
+        <p:txBody>
+          <a:bodyPr/>
+          <a:lstStyle/>
+          <a:p>
+            <a:endParaRPr lang="el-GR"/>
+          </a:p>
+        </p:txBody>
       </p:sp>
       <p:sp>
         <p:nvSpPr>
@@ -13032,6 +13915,13 @@
           </a:effectRef>
           <a:fontRef idx="minor"/>
         </p:style>
+        <p:txBody>
+          <a:bodyPr/>
+          <a:lstStyle/>
+          <a:p>
+            <a:endParaRPr lang="el-GR"/>
+          </a:p>
+        </p:txBody>
       </p:sp>
       <p:sp>
         <p:nvSpPr>
@@ -13068,6 +13958,13 @@
           </a:effectRef>
           <a:fontRef idx="minor"/>
         </p:style>
+        <p:txBody>
+          <a:bodyPr/>
+          <a:lstStyle/>
+          <a:p>
+            <a:endParaRPr lang="el-GR"/>
+          </a:p>
+        </p:txBody>
       </p:sp>
       <p:sp>
         <p:nvSpPr>
@@ -13104,6 +14001,13 @@
           </a:effectRef>
           <a:fontRef idx="minor"/>
         </p:style>
+        <p:txBody>
+          <a:bodyPr/>
+          <a:lstStyle/>
+          <a:p>
+            <a:endParaRPr lang="el-GR"/>
+          </a:p>
+        </p:txBody>
       </p:sp>
       <p:sp>
         <p:nvSpPr>
@@ -13787,6 +14691,13 @@
           </a:effectRef>
           <a:fontRef idx="minor"/>
         </p:style>
+        <p:txBody>
+          <a:bodyPr/>
+          <a:lstStyle/>
+          <a:p>
+            <a:endParaRPr lang="el-GR"/>
+          </a:p>
+        </p:txBody>
       </p:sp>
       <p:sp>
         <p:nvSpPr>
@@ -13821,6 +14732,13 @@
           </a:effectRef>
           <a:fontRef idx="minor"/>
         </p:style>
+        <p:txBody>
+          <a:bodyPr/>
+          <a:lstStyle/>
+          <a:p>
+            <a:endParaRPr lang="el-GR"/>
+          </a:p>
+        </p:txBody>
       </p:sp>
       <p:sp>
         <p:nvSpPr>
@@ -13855,6 +14773,13 @@
           </a:effectRef>
           <a:fontRef idx="minor"/>
         </p:style>
+        <p:txBody>
+          <a:bodyPr/>
+          <a:lstStyle/>
+          <a:p>
+            <a:endParaRPr lang="el-GR"/>
+          </a:p>
+        </p:txBody>
       </p:sp>
       <p:grpSp>
         <p:nvGrpSpPr>
@@ -13903,6 +14828,13 @@
             </a:effectRef>
             <a:fontRef idx="minor"/>
           </p:style>
+          <p:txBody>
+            <a:bodyPr/>
+            <a:lstStyle/>
+            <a:p>
+              <a:endParaRPr lang="el-GR"/>
+            </a:p>
+          </p:txBody>
         </p:sp>
         <p:sp>
           <p:nvSpPr>
@@ -13937,6 +14869,13 @@
             </a:effectRef>
             <a:fontRef idx="minor"/>
           </p:style>
+          <p:txBody>
+            <a:bodyPr/>
+            <a:lstStyle/>
+            <a:p>
+              <a:endParaRPr lang="el-GR"/>
+            </a:p>
+          </p:txBody>
         </p:sp>
         <p:sp>
           <p:nvSpPr>
@@ -14058,6 +14997,13 @@
           </a:effectRef>
           <a:fontRef idx="minor"/>
         </p:style>
+        <p:txBody>
+          <a:bodyPr/>
+          <a:lstStyle/>
+          <a:p>
+            <a:endParaRPr lang="el-GR"/>
+          </a:p>
+        </p:txBody>
       </p:sp>
       <p:sp>
         <p:nvSpPr>
@@ -14092,6 +15038,13 @@
           </a:effectRef>
           <a:fontRef idx="minor"/>
         </p:style>
+        <p:txBody>
+          <a:bodyPr/>
+          <a:lstStyle/>
+          <a:p>
+            <a:endParaRPr lang="el-GR"/>
+          </a:p>
+        </p:txBody>
       </p:sp>
       <p:sp>
         <p:nvSpPr>
@@ -14126,6 +15079,13 @@
           </a:effectRef>
           <a:fontRef idx="minor"/>
         </p:style>
+        <p:txBody>
+          <a:bodyPr/>
+          <a:lstStyle/>
+          <a:p>
+            <a:endParaRPr lang="el-GR"/>
+          </a:p>
+        </p:txBody>
       </p:sp>
       <p:sp>
         <p:nvSpPr>
@@ -14160,6 +15120,13 @@
           </a:effectRef>
           <a:fontRef idx="minor"/>
         </p:style>
+        <p:txBody>
+          <a:bodyPr/>
+          <a:lstStyle/>
+          <a:p>
+            <a:endParaRPr lang="el-GR"/>
+          </a:p>
+        </p:txBody>
       </p:sp>
       <p:sp>
         <p:nvSpPr>
@@ -14196,6 +15163,13 @@
           </a:effectRef>
           <a:fontRef idx="minor"/>
         </p:style>
+        <p:txBody>
+          <a:bodyPr/>
+          <a:lstStyle/>
+          <a:p>
+            <a:endParaRPr lang="el-GR"/>
+          </a:p>
+        </p:txBody>
       </p:sp>
       <p:sp>
         <p:nvSpPr>
@@ -14232,6 +15206,13 @@
           </a:effectRef>
           <a:fontRef idx="minor"/>
         </p:style>
+        <p:txBody>
+          <a:bodyPr/>
+          <a:lstStyle/>
+          <a:p>
+            <a:endParaRPr lang="el-GR"/>
+          </a:p>
+        </p:txBody>
       </p:sp>
       <p:sp>
         <p:nvSpPr>
@@ -14354,6 +15335,13 @@
             </a:effectRef>
             <a:fontRef idx="minor"/>
           </p:style>
+          <p:txBody>
+            <a:bodyPr/>
+            <a:lstStyle/>
+            <a:p>
+              <a:endParaRPr lang="el-GR"/>
+            </a:p>
+          </p:txBody>
         </p:sp>
         <p:sp>
           <p:nvSpPr>
@@ -14388,6 +15376,13 @@
             </a:effectRef>
             <a:fontRef idx="minor"/>
           </p:style>
+          <p:txBody>
+            <a:bodyPr/>
+            <a:lstStyle/>
+            <a:p>
+              <a:endParaRPr lang="el-GR"/>
+            </a:p>
+          </p:txBody>
         </p:sp>
         <p:sp>
           <p:nvSpPr>
@@ -14422,6 +15417,13 @@
             </a:effectRef>
             <a:fontRef idx="minor"/>
           </p:style>
+          <p:txBody>
+            <a:bodyPr/>
+            <a:lstStyle/>
+            <a:p>
+              <a:endParaRPr lang="el-GR"/>
+            </a:p>
+          </p:txBody>
         </p:sp>
         <p:sp>
           <p:nvSpPr>
@@ -14456,6 +15458,13 @@
             </a:effectRef>
             <a:fontRef idx="minor"/>
           </p:style>
+          <p:txBody>
+            <a:bodyPr/>
+            <a:lstStyle/>
+            <a:p>
+              <a:endParaRPr lang="el-GR"/>
+            </a:p>
+          </p:txBody>
         </p:sp>
         <p:sp>
           <p:nvSpPr>
@@ -14490,6 +15499,13 @@
             </a:effectRef>
             <a:fontRef idx="minor"/>
           </p:style>
+          <p:txBody>
+            <a:bodyPr/>
+            <a:lstStyle/>
+            <a:p>
+              <a:endParaRPr lang="el-GR"/>
+            </a:p>
+          </p:txBody>
         </p:sp>
         <p:sp>
           <p:nvSpPr>
@@ -14524,6 +15540,13 @@
             </a:effectRef>
             <a:fontRef idx="minor"/>
           </p:style>
+          <p:txBody>
+            <a:bodyPr/>
+            <a:lstStyle/>
+            <a:p>
+              <a:endParaRPr lang="el-GR"/>
+            </a:p>
+          </p:txBody>
         </p:sp>
         <p:sp>
           <p:nvSpPr>
@@ -14558,6 +15581,13 @@
             </a:effectRef>
             <a:fontRef idx="minor"/>
           </p:style>
+          <p:txBody>
+            <a:bodyPr/>
+            <a:lstStyle/>
+            <a:p>
+              <a:endParaRPr lang="el-GR"/>
+            </a:p>
+          </p:txBody>
         </p:sp>
         <p:sp>
           <p:nvSpPr>
@@ -14592,6 +15622,13 @@
             </a:effectRef>
             <a:fontRef idx="minor"/>
           </p:style>
+          <p:txBody>
+            <a:bodyPr/>
+            <a:lstStyle/>
+            <a:p>
+              <a:endParaRPr lang="el-GR"/>
+            </a:p>
+          </p:txBody>
         </p:sp>
         <p:sp>
           <p:nvSpPr>
@@ -14626,6 +15663,13 @@
             </a:effectRef>
             <a:fontRef idx="minor"/>
           </p:style>
+          <p:txBody>
+            <a:bodyPr/>
+            <a:lstStyle/>
+            <a:p>
+              <a:endParaRPr lang="el-GR"/>
+            </a:p>
+          </p:txBody>
         </p:sp>
         <p:sp>
           <p:nvSpPr>
@@ -14660,6 +15704,13 @@
             </a:effectRef>
             <a:fontRef idx="minor"/>
           </p:style>
+          <p:txBody>
+            <a:bodyPr/>
+            <a:lstStyle/>
+            <a:p>
+              <a:endParaRPr lang="el-GR"/>
+            </a:p>
+          </p:txBody>
         </p:sp>
         <p:sp>
           <p:nvSpPr>
@@ -14694,6 +15745,13 @@
             </a:effectRef>
             <a:fontRef idx="minor"/>
           </p:style>
+          <p:txBody>
+            <a:bodyPr/>
+            <a:lstStyle/>
+            <a:p>
+              <a:endParaRPr lang="el-GR"/>
+            </a:p>
+          </p:txBody>
         </p:sp>
         <p:sp>
           <p:nvSpPr>
@@ -14728,6 +15786,13 @@
             </a:effectRef>
             <a:fontRef idx="minor"/>
           </p:style>
+          <p:txBody>
+            <a:bodyPr/>
+            <a:lstStyle/>
+            <a:p>
+              <a:endParaRPr lang="el-GR"/>
+            </a:p>
+          </p:txBody>
         </p:sp>
       </p:grpSp>
       <p:sp>

</xml_diff>